<commit_message>
Finished technical overview section
</commit_message>
<xml_diff>
--- a/docs/webinar/MeteorWebinarPresentation.pptx
+++ b/docs/webinar/MeteorWebinarPresentation.pptx
@@ -19,9 +19,9 @@
     <p:sldId id="267" r:id="rId10"/>
     <p:sldId id="269" r:id="rId11"/>
     <p:sldId id="271" r:id="rId12"/>
-    <p:sldId id="260" r:id="rId13"/>
-    <p:sldId id="261" r:id="rId14"/>
-    <p:sldId id="268" r:id="rId15"/>
+    <p:sldId id="272" r:id="rId13"/>
+    <p:sldId id="260" r:id="rId14"/>
+    <p:sldId id="261" r:id="rId15"/>
     <p:sldId id="262" r:id="rId16"/>
   </p:sldIdLst>
   <p:sldSz cx="9144000" cy="6858000" type="screen4x3"/>
@@ -944,6 +944,444 @@
 </file>
 
 <file path=ppt/slideLayouts/slideLayout10.xml><?xml version="1.0" encoding="utf-8"?>
+<p:sldLayout xmlns:a="http://schemas.openxmlformats.org/drawingml/2006/main" xmlns:r="http://schemas.openxmlformats.org/officeDocument/2006/relationships" xmlns:p="http://schemas.openxmlformats.org/presentationml/2006/main" type="objTx" preserve="1">
+  <p:cSld name="Content with Caption">
+    <p:spTree>
+      <p:nvGrpSpPr>
+        <p:cNvPr id="1" name=""/>
+        <p:cNvGrpSpPr/>
+        <p:nvPr/>
+      </p:nvGrpSpPr>
+      <p:grpSpPr>
+        <a:xfrm>
+          <a:off x="0" y="0"/>
+          <a:ext cx="0" cy="0"/>
+          <a:chOff x="0" y="0"/>
+          <a:chExt cx="0" cy="0"/>
+        </a:xfrm>
+      </p:grpSpPr>
+      <p:sp>
+        <p:nvSpPr>
+          <p:cNvPr id="2" name="Title 1"/>
+          <p:cNvSpPr>
+            <a:spLocks noGrp="1"/>
+          </p:cNvSpPr>
+          <p:nvPr>
+            <p:ph type="title"/>
+          </p:nvPr>
+        </p:nvSpPr>
+        <p:spPr>
+          <a:xfrm>
+            <a:off x="457200" y="273050"/>
+            <a:ext cx="3008313" cy="1162050"/>
+          </a:xfrm>
+        </p:spPr>
+        <p:txBody>
+          <a:bodyPr anchor="b"/>
+          <a:lstStyle>
+            <a:lvl1pPr algn="l">
+              <a:defRPr sz="2000" b="1"/>
+            </a:lvl1pPr>
+          </a:lstStyle>
+          <a:p>
+            <a:r>
+              <a:rPr lang="en-US" smtClean="0"/>
+              <a:t>Click to edit Master title style</a:t>
+            </a:r>
+            <a:endParaRPr lang="en-US"/>
+          </a:p>
+        </p:txBody>
+      </p:sp>
+      <p:sp>
+        <p:nvSpPr>
+          <p:cNvPr id="3" name="Content Placeholder 2"/>
+          <p:cNvSpPr>
+            <a:spLocks noGrp="1"/>
+          </p:cNvSpPr>
+          <p:nvPr>
+            <p:ph idx="1"/>
+          </p:nvPr>
+        </p:nvSpPr>
+        <p:spPr>
+          <a:xfrm>
+            <a:off x="3575050" y="273050"/>
+            <a:ext cx="5111750" cy="5853113"/>
+          </a:xfrm>
+        </p:spPr>
+        <p:txBody>
+          <a:bodyPr/>
+          <a:lstStyle>
+            <a:lvl1pPr>
+              <a:defRPr sz="3200"/>
+            </a:lvl1pPr>
+            <a:lvl2pPr>
+              <a:defRPr sz="2800"/>
+            </a:lvl2pPr>
+            <a:lvl3pPr>
+              <a:defRPr sz="2400"/>
+            </a:lvl3pPr>
+            <a:lvl4pPr>
+              <a:defRPr sz="2000"/>
+            </a:lvl4pPr>
+            <a:lvl5pPr>
+              <a:defRPr sz="2000"/>
+            </a:lvl5pPr>
+            <a:lvl6pPr>
+              <a:defRPr sz="2000"/>
+            </a:lvl6pPr>
+            <a:lvl7pPr>
+              <a:defRPr sz="2000"/>
+            </a:lvl7pPr>
+            <a:lvl8pPr>
+              <a:defRPr sz="2000"/>
+            </a:lvl8pPr>
+            <a:lvl9pPr>
+              <a:defRPr sz="2000"/>
+            </a:lvl9pPr>
+          </a:lstStyle>
+          <a:p>
+            <a:pPr lvl="0"/>
+            <a:r>
+              <a:rPr lang="en-US" smtClean="0"/>
+              <a:t>Click to edit Master text styles</a:t>
+            </a:r>
+          </a:p>
+          <a:p>
+            <a:pPr lvl="1"/>
+            <a:r>
+              <a:rPr lang="en-US" smtClean="0"/>
+              <a:t>Second level</a:t>
+            </a:r>
+          </a:p>
+          <a:p>
+            <a:pPr lvl="2"/>
+            <a:r>
+              <a:rPr lang="en-US" smtClean="0"/>
+              <a:t>Third level</a:t>
+            </a:r>
+          </a:p>
+          <a:p>
+            <a:pPr lvl="3"/>
+            <a:r>
+              <a:rPr lang="en-US" smtClean="0"/>
+              <a:t>Fourth level</a:t>
+            </a:r>
+          </a:p>
+          <a:p>
+            <a:pPr lvl="4"/>
+            <a:r>
+              <a:rPr lang="en-US" smtClean="0"/>
+              <a:t>Fifth level</a:t>
+            </a:r>
+            <a:endParaRPr lang="en-US"/>
+          </a:p>
+        </p:txBody>
+      </p:sp>
+      <p:sp>
+        <p:nvSpPr>
+          <p:cNvPr id="4" name="Text Placeholder 3"/>
+          <p:cNvSpPr>
+            <a:spLocks noGrp="1"/>
+          </p:cNvSpPr>
+          <p:nvPr>
+            <p:ph type="body" sz="half" idx="2"/>
+          </p:nvPr>
+        </p:nvSpPr>
+        <p:spPr>
+          <a:xfrm>
+            <a:off x="457200" y="1435100"/>
+            <a:ext cx="3008313" cy="4691063"/>
+          </a:xfrm>
+        </p:spPr>
+        <p:txBody>
+          <a:bodyPr/>
+          <a:lstStyle>
+            <a:lvl1pPr marL="0" indent="0">
+              <a:buNone/>
+              <a:defRPr sz="1400"/>
+            </a:lvl1pPr>
+            <a:lvl2pPr marL="457200" indent="0">
+              <a:buNone/>
+              <a:defRPr sz="1200"/>
+            </a:lvl2pPr>
+            <a:lvl3pPr marL="914400" indent="0">
+              <a:buNone/>
+              <a:defRPr sz="1000"/>
+            </a:lvl3pPr>
+            <a:lvl4pPr marL="1371600" indent="0">
+              <a:buNone/>
+              <a:defRPr sz="900"/>
+            </a:lvl4pPr>
+            <a:lvl5pPr marL="1828800" indent="0">
+              <a:buNone/>
+              <a:defRPr sz="900"/>
+            </a:lvl5pPr>
+            <a:lvl6pPr marL="2286000" indent="0">
+              <a:buNone/>
+              <a:defRPr sz="900"/>
+            </a:lvl6pPr>
+            <a:lvl7pPr marL="2743200" indent="0">
+              <a:buNone/>
+              <a:defRPr sz="900"/>
+            </a:lvl7pPr>
+            <a:lvl8pPr marL="3200400" indent="0">
+              <a:buNone/>
+              <a:defRPr sz="900"/>
+            </a:lvl8pPr>
+            <a:lvl9pPr marL="3657600" indent="0">
+              <a:buNone/>
+              <a:defRPr sz="900"/>
+            </a:lvl9pPr>
+          </a:lstStyle>
+          <a:p>
+            <a:pPr lvl="0"/>
+            <a:r>
+              <a:rPr lang="en-US" smtClean="0"/>
+              <a:t>Click to edit Master text styles</a:t>
+            </a:r>
+          </a:p>
+        </p:txBody>
+      </p:sp>
+      <p:sp>
+        <p:nvSpPr>
+          <p:cNvPr id="7" name="Slide Number Placeholder 6"/>
+          <p:cNvSpPr>
+            <a:spLocks noGrp="1"/>
+          </p:cNvSpPr>
+          <p:nvPr>
+            <p:ph type="sldNum" sz="quarter" idx="12"/>
+          </p:nvPr>
+        </p:nvSpPr>
+        <p:spPr/>
+        <p:txBody>
+          <a:bodyPr/>
+          <a:lstStyle/>
+          <a:p>
+            <a:fld id="{6F99343D-46AE-4C14-8296-D13D823691DC}" type="slidenum">
+              <a:rPr lang="en-US" smtClean="0"/>
+              <a:pPr/>
+              <a:t>‹#›</a:t>
+            </a:fld>
+            <a:endParaRPr lang="en-US" dirty="0"/>
+          </a:p>
+        </p:txBody>
+      </p:sp>
+    </p:spTree>
+  </p:cSld>
+  <p:clrMapOvr>
+    <a:masterClrMapping/>
+  </p:clrMapOvr>
+</p:sldLayout>
+</file>
+
+<file path=ppt/slideLayouts/slideLayout11.xml><?xml version="1.0" encoding="utf-8"?>
+<p:sldLayout xmlns:a="http://schemas.openxmlformats.org/drawingml/2006/main" xmlns:r="http://schemas.openxmlformats.org/officeDocument/2006/relationships" xmlns:p="http://schemas.openxmlformats.org/presentationml/2006/main" type="picTx" preserve="1">
+  <p:cSld name="Picture with Caption">
+    <p:spTree>
+      <p:nvGrpSpPr>
+        <p:cNvPr id="1" name=""/>
+        <p:cNvGrpSpPr/>
+        <p:nvPr/>
+      </p:nvGrpSpPr>
+      <p:grpSpPr>
+        <a:xfrm>
+          <a:off x="0" y="0"/>
+          <a:ext cx="0" cy="0"/>
+          <a:chOff x="0" y="0"/>
+          <a:chExt cx="0" cy="0"/>
+        </a:xfrm>
+      </p:grpSpPr>
+      <p:sp>
+        <p:nvSpPr>
+          <p:cNvPr id="2" name="Title 1"/>
+          <p:cNvSpPr>
+            <a:spLocks noGrp="1"/>
+          </p:cNvSpPr>
+          <p:nvPr>
+            <p:ph type="title"/>
+          </p:nvPr>
+        </p:nvSpPr>
+        <p:spPr>
+          <a:xfrm>
+            <a:off x="1792288" y="4800600"/>
+            <a:ext cx="5486400" cy="566738"/>
+          </a:xfrm>
+        </p:spPr>
+        <p:txBody>
+          <a:bodyPr anchor="b"/>
+          <a:lstStyle>
+            <a:lvl1pPr algn="l">
+              <a:defRPr sz="2000" b="1"/>
+            </a:lvl1pPr>
+          </a:lstStyle>
+          <a:p>
+            <a:r>
+              <a:rPr lang="en-US" smtClean="0"/>
+              <a:t>Click to edit Master title style</a:t>
+            </a:r>
+            <a:endParaRPr lang="en-US"/>
+          </a:p>
+        </p:txBody>
+      </p:sp>
+      <p:sp>
+        <p:nvSpPr>
+          <p:cNvPr id="3" name="Picture Placeholder 2"/>
+          <p:cNvSpPr>
+            <a:spLocks noGrp="1"/>
+          </p:cNvSpPr>
+          <p:nvPr>
+            <p:ph type="pic" idx="1"/>
+          </p:nvPr>
+        </p:nvSpPr>
+        <p:spPr>
+          <a:xfrm>
+            <a:off x="1792288" y="612775"/>
+            <a:ext cx="5486400" cy="4114800"/>
+          </a:xfrm>
+        </p:spPr>
+        <p:txBody>
+          <a:bodyPr/>
+          <a:lstStyle>
+            <a:lvl1pPr marL="0" indent="0">
+              <a:buNone/>
+              <a:defRPr sz="3200"/>
+            </a:lvl1pPr>
+            <a:lvl2pPr marL="457200" indent="0">
+              <a:buNone/>
+              <a:defRPr sz="2800"/>
+            </a:lvl2pPr>
+            <a:lvl3pPr marL="914400" indent="0">
+              <a:buNone/>
+              <a:defRPr sz="2400"/>
+            </a:lvl3pPr>
+            <a:lvl4pPr marL="1371600" indent="0">
+              <a:buNone/>
+              <a:defRPr sz="2000"/>
+            </a:lvl4pPr>
+            <a:lvl5pPr marL="1828800" indent="0">
+              <a:buNone/>
+              <a:defRPr sz="2000"/>
+            </a:lvl5pPr>
+            <a:lvl6pPr marL="2286000" indent="0">
+              <a:buNone/>
+              <a:defRPr sz="2000"/>
+            </a:lvl6pPr>
+            <a:lvl7pPr marL="2743200" indent="0">
+              <a:buNone/>
+              <a:defRPr sz="2000"/>
+            </a:lvl7pPr>
+            <a:lvl8pPr marL="3200400" indent="0">
+              <a:buNone/>
+              <a:defRPr sz="2000"/>
+            </a:lvl8pPr>
+            <a:lvl9pPr marL="3657600" indent="0">
+              <a:buNone/>
+              <a:defRPr sz="2000"/>
+            </a:lvl9pPr>
+          </a:lstStyle>
+          <a:p>
+            <a:endParaRPr lang="en-US" dirty="0"/>
+          </a:p>
+        </p:txBody>
+      </p:sp>
+      <p:sp>
+        <p:nvSpPr>
+          <p:cNvPr id="4" name="Text Placeholder 3"/>
+          <p:cNvSpPr>
+            <a:spLocks noGrp="1"/>
+          </p:cNvSpPr>
+          <p:nvPr>
+            <p:ph type="body" sz="half" idx="2"/>
+          </p:nvPr>
+        </p:nvSpPr>
+        <p:spPr>
+          <a:xfrm>
+            <a:off x="1792288" y="5367338"/>
+            <a:ext cx="5486400" cy="804862"/>
+          </a:xfrm>
+        </p:spPr>
+        <p:txBody>
+          <a:bodyPr/>
+          <a:lstStyle>
+            <a:lvl1pPr marL="0" indent="0">
+              <a:buNone/>
+              <a:defRPr sz="1400"/>
+            </a:lvl1pPr>
+            <a:lvl2pPr marL="457200" indent="0">
+              <a:buNone/>
+              <a:defRPr sz="1200"/>
+            </a:lvl2pPr>
+            <a:lvl3pPr marL="914400" indent="0">
+              <a:buNone/>
+              <a:defRPr sz="1000"/>
+            </a:lvl3pPr>
+            <a:lvl4pPr marL="1371600" indent="0">
+              <a:buNone/>
+              <a:defRPr sz="900"/>
+            </a:lvl4pPr>
+            <a:lvl5pPr marL="1828800" indent="0">
+              <a:buNone/>
+              <a:defRPr sz="900"/>
+            </a:lvl5pPr>
+            <a:lvl6pPr marL="2286000" indent="0">
+              <a:buNone/>
+              <a:defRPr sz="900"/>
+            </a:lvl6pPr>
+            <a:lvl7pPr marL="2743200" indent="0">
+              <a:buNone/>
+              <a:defRPr sz="900"/>
+            </a:lvl7pPr>
+            <a:lvl8pPr marL="3200400" indent="0">
+              <a:buNone/>
+              <a:defRPr sz="900"/>
+            </a:lvl8pPr>
+            <a:lvl9pPr marL="3657600" indent="0">
+              <a:buNone/>
+              <a:defRPr sz="900"/>
+            </a:lvl9pPr>
+          </a:lstStyle>
+          <a:p>
+            <a:pPr lvl="0"/>
+            <a:r>
+              <a:rPr lang="en-US" smtClean="0"/>
+              <a:t>Click to edit Master text styles</a:t>
+            </a:r>
+          </a:p>
+        </p:txBody>
+      </p:sp>
+      <p:sp>
+        <p:nvSpPr>
+          <p:cNvPr id="7" name="Slide Number Placeholder 6"/>
+          <p:cNvSpPr>
+            <a:spLocks noGrp="1"/>
+          </p:cNvSpPr>
+          <p:nvPr>
+            <p:ph type="sldNum" sz="quarter" idx="12"/>
+          </p:nvPr>
+        </p:nvSpPr>
+        <p:spPr/>
+        <p:txBody>
+          <a:bodyPr/>
+          <a:lstStyle/>
+          <a:p>
+            <a:fld id="{6F99343D-46AE-4C14-8296-D13D823691DC}" type="slidenum">
+              <a:rPr lang="en-US" smtClean="0"/>
+              <a:pPr/>
+              <a:t>‹#›</a:t>
+            </a:fld>
+            <a:endParaRPr lang="en-US" dirty="0"/>
+          </a:p>
+        </p:txBody>
+      </p:sp>
+    </p:spTree>
+  </p:cSld>
+  <p:clrMapOvr>
+    <a:masterClrMapping/>
+  </p:clrMapOvr>
+</p:sldLayout>
+</file>
+
+<file path=ppt/slideLayouts/slideLayout12.xml><?xml version="1.0" encoding="utf-8"?>
 <p:sldLayout xmlns:a="http://schemas.openxmlformats.org/drawingml/2006/main" xmlns:r="http://schemas.openxmlformats.org/officeDocument/2006/relationships" xmlns:p="http://schemas.openxmlformats.org/presentationml/2006/main" type="vertTx" preserve="1">
   <p:cSld name="Title and Vertical Text">
     <p:spTree>
@@ -1067,7 +1505,7 @@
 </p:sldLayout>
 </file>
 
-<file path=ppt/slideLayouts/slideLayout11.xml><?xml version="1.0" encoding="utf-8"?>
+<file path=ppt/slideLayouts/slideLayout13.xml><?xml version="1.0" encoding="utf-8"?>
 <p:sldLayout xmlns:a="http://schemas.openxmlformats.org/drawingml/2006/main" xmlns:r="http://schemas.openxmlformats.org/officeDocument/2006/relationships" xmlns:p="http://schemas.openxmlformats.org/presentationml/2006/main" type="vertTitleAndTx" preserve="1">
   <p:cSld name="Vertical Title and Text">
     <p:spTree>
@@ -1645,6 +2083,490 @@
 </file>
 
 <file path=ppt/slideLayouts/slideLayout5.xml><?xml version="1.0" encoding="utf-8"?>
+<p:sldLayout xmlns:a="http://schemas.openxmlformats.org/drawingml/2006/main" xmlns:r="http://schemas.openxmlformats.org/officeDocument/2006/relationships" xmlns:p="http://schemas.openxmlformats.org/presentationml/2006/main" type="twoObj" preserve="1">
+  <p:cSld name="Two Content Bigger Left">
+    <p:spTree>
+      <p:nvGrpSpPr>
+        <p:cNvPr id="1" name=""/>
+        <p:cNvGrpSpPr/>
+        <p:nvPr/>
+      </p:nvGrpSpPr>
+      <p:grpSpPr>
+        <a:xfrm>
+          <a:off x="0" y="0"/>
+          <a:ext cx="0" cy="0"/>
+          <a:chOff x="0" y="0"/>
+          <a:chExt cx="0" cy="0"/>
+        </a:xfrm>
+      </p:grpSpPr>
+      <p:sp>
+        <p:nvSpPr>
+          <p:cNvPr id="2" name="Title 1"/>
+          <p:cNvSpPr>
+            <a:spLocks noGrp="1"/>
+          </p:cNvSpPr>
+          <p:nvPr>
+            <p:ph type="title"/>
+          </p:nvPr>
+        </p:nvSpPr>
+        <p:spPr/>
+        <p:txBody>
+          <a:bodyPr/>
+          <a:lstStyle/>
+          <a:p>
+            <a:r>
+              <a:rPr lang="en-US" smtClean="0"/>
+              <a:t>Click to edit Master title style</a:t>
+            </a:r>
+            <a:endParaRPr lang="en-US"/>
+          </a:p>
+        </p:txBody>
+      </p:sp>
+      <p:sp>
+        <p:nvSpPr>
+          <p:cNvPr id="3" name="Content Placeholder 2"/>
+          <p:cNvSpPr>
+            <a:spLocks noGrp="1"/>
+          </p:cNvSpPr>
+          <p:nvPr>
+            <p:ph sz="half" idx="1"/>
+          </p:nvPr>
+        </p:nvSpPr>
+        <p:spPr>
+          <a:xfrm>
+            <a:off x="457200" y="1600200"/>
+            <a:ext cx="5029200" cy="4525963"/>
+          </a:xfrm>
+        </p:spPr>
+        <p:txBody>
+          <a:bodyPr/>
+          <a:lstStyle>
+            <a:lvl1pPr>
+              <a:defRPr sz="2800"/>
+            </a:lvl1pPr>
+            <a:lvl2pPr>
+              <a:defRPr sz="2400"/>
+            </a:lvl2pPr>
+            <a:lvl3pPr>
+              <a:defRPr sz="2000"/>
+            </a:lvl3pPr>
+            <a:lvl4pPr>
+              <a:defRPr sz="1800"/>
+            </a:lvl4pPr>
+            <a:lvl5pPr>
+              <a:defRPr sz="1800"/>
+            </a:lvl5pPr>
+            <a:lvl6pPr>
+              <a:defRPr sz="1800"/>
+            </a:lvl6pPr>
+            <a:lvl7pPr>
+              <a:defRPr sz="1800"/>
+            </a:lvl7pPr>
+            <a:lvl8pPr>
+              <a:defRPr sz="1800"/>
+            </a:lvl8pPr>
+            <a:lvl9pPr>
+              <a:defRPr sz="1800"/>
+            </a:lvl9pPr>
+          </a:lstStyle>
+          <a:p>
+            <a:pPr lvl="0"/>
+            <a:r>
+              <a:rPr lang="en-US" smtClean="0"/>
+              <a:t>Click to edit Master text styles</a:t>
+            </a:r>
+          </a:p>
+          <a:p>
+            <a:pPr lvl="1"/>
+            <a:r>
+              <a:rPr lang="en-US" smtClean="0"/>
+              <a:t>Second level</a:t>
+            </a:r>
+          </a:p>
+          <a:p>
+            <a:pPr lvl="2"/>
+            <a:r>
+              <a:rPr lang="en-US" smtClean="0"/>
+              <a:t>Third level</a:t>
+            </a:r>
+          </a:p>
+          <a:p>
+            <a:pPr lvl="3"/>
+            <a:r>
+              <a:rPr lang="en-US" smtClean="0"/>
+              <a:t>Fourth level</a:t>
+            </a:r>
+          </a:p>
+          <a:p>
+            <a:pPr lvl="4"/>
+            <a:r>
+              <a:rPr lang="en-US" smtClean="0"/>
+              <a:t>Fifth level</a:t>
+            </a:r>
+            <a:endParaRPr lang="en-US"/>
+          </a:p>
+        </p:txBody>
+      </p:sp>
+      <p:sp>
+        <p:nvSpPr>
+          <p:cNvPr id="4" name="Content Placeholder 3"/>
+          <p:cNvSpPr>
+            <a:spLocks noGrp="1"/>
+          </p:cNvSpPr>
+          <p:nvPr>
+            <p:ph sz="half" idx="2"/>
+          </p:nvPr>
+        </p:nvSpPr>
+        <p:spPr>
+          <a:xfrm>
+            <a:off x="5638800" y="1600200"/>
+            <a:ext cx="3048000" cy="4525963"/>
+          </a:xfrm>
+        </p:spPr>
+        <p:txBody>
+          <a:bodyPr/>
+          <a:lstStyle>
+            <a:lvl1pPr>
+              <a:defRPr sz="2800"/>
+            </a:lvl1pPr>
+            <a:lvl2pPr>
+              <a:defRPr sz="2400"/>
+            </a:lvl2pPr>
+            <a:lvl3pPr>
+              <a:defRPr sz="2000"/>
+            </a:lvl3pPr>
+            <a:lvl4pPr>
+              <a:defRPr sz="1800"/>
+            </a:lvl4pPr>
+            <a:lvl5pPr>
+              <a:defRPr sz="1800"/>
+            </a:lvl5pPr>
+            <a:lvl6pPr>
+              <a:defRPr sz="1800"/>
+            </a:lvl6pPr>
+            <a:lvl7pPr>
+              <a:defRPr sz="1800"/>
+            </a:lvl7pPr>
+            <a:lvl8pPr>
+              <a:defRPr sz="1800"/>
+            </a:lvl8pPr>
+            <a:lvl9pPr>
+              <a:defRPr sz="1800"/>
+            </a:lvl9pPr>
+          </a:lstStyle>
+          <a:p>
+            <a:pPr lvl="0"/>
+            <a:r>
+              <a:rPr lang="en-US" dirty="0" smtClean="0"/>
+              <a:t>Click to edit Master text styles</a:t>
+            </a:r>
+          </a:p>
+          <a:p>
+            <a:pPr lvl="1"/>
+            <a:r>
+              <a:rPr lang="en-US" dirty="0" smtClean="0"/>
+              <a:t>Second level</a:t>
+            </a:r>
+          </a:p>
+          <a:p>
+            <a:pPr lvl="2"/>
+            <a:r>
+              <a:rPr lang="en-US" dirty="0" smtClean="0"/>
+              <a:t>Third level</a:t>
+            </a:r>
+          </a:p>
+          <a:p>
+            <a:pPr lvl="3"/>
+            <a:r>
+              <a:rPr lang="en-US" dirty="0" smtClean="0"/>
+              <a:t>Fourth level</a:t>
+            </a:r>
+          </a:p>
+          <a:p>
+            <a:pPr lvl="4"/>
+            <a:r>
+              <a:rPr lang="en-US" dirty="0" smtClean="0"/>
+              <a:t>Fifth level</a:t>
+            </a:r>
+            <a:endParaRPr lang="en-US" dirty="0"/>
+          </a:p>
+        </p:txBody>
+      </p:sp>
+      <p:sp>
+        <p:nvSpPr>
+          <p:cNvPr id="7" name="Slide Number Placeholder 6"/>
+          <p:cNvSpPr>
+            <a:spLocks noGrp="1"/>
+          </p:cNvSpPr>
+          <p:nvPr>
+            <p:ph type="sldNum" sz="quarter" idx="12"/>
+          </p:nvPr>
+        </p:nvSpPr>
+        <p:spPr/>
+        <p:txBody>
+          <a:bodyPr/>
+          <a:lstStyle/>
+          <a:p>
+            <a:fld id="{6F99343D-46AE-4C14-8296-D13D823691DC}" type="slidenum">
+              <a:rPr lang="en-US" smtClean="0"/>
+              <a:pPr/>
+              <a:t>‹#›</a:t>
+            </a:fld>
+            <a:endParaRPr lang="en-US" dirty="0"/>
+          </a:p>
+        </p:txBody>
+      </p:sp>
+    </p:spTree>
+  </p:cSld>
+  <p:clrMapOvr>
+    <a:masterClrMapping/>
+  </p:clrMapOvr>
+</p:sldLayout>
+</file>
+
+<file path=ppt/slideLayouts/slideLayout6.xml><?xml version="1.0" encoding="utf-8"?>
+<p:sldLayout xmlns:a="http://schemas.openxmlformats.org/drawingml/2006/main" xmlns:r="http://schemas.openxmlformats.org/officeDocument/2006/relationships" xmlns:p="http://schemas.openxmlformats.org/presentationml/2006/main" type="twoObj" preserve="1">
+  <p:cSld name="Two Content Bigger Right">
+    <p:spTree>
+      <p:nvGrpSpPr>
+        <p:cNvPr id="1" name=""/>
+        <p:cNvGrpSpPr/>
+        <p:nvPr/>
+      </p:nvGrpSpPr>
+      <p:grpSpPr>
+        <a:xfrm>
+          <a:off x="0" y="0"/>
+          <a:ext cx="0" cy="0"/>
+          <a:chOff x="0" y="0"/>
+          <a:chExt cx="0" cy="0"/>
+        </a:xfrm>
+      </p:grpSpPr>
+      <p:sp>
+        <p:nvSpPr>
+          <p:cNvPr id="2" name="Title 1"/>
+          <p:cNvSpPr>
+            <a:spLocks noGrp="1"/>
+          </p:cNvSpPr>
+          <p:nvPr>
+            <p:ph type="title"/>
+          </p:nvPr>
+        </p:nvSpPr>
+        <p:spPr/>
+        <p:txBody>
+          <a:bodyPr/>
+          <a:lstStyle/>
+          <a:p>
+            <a:r>
+              <a:rPr lang="en-US" smtClean="0"/>
+              <a:t>Click to edit Master title style</a:t>
+            </a:r>
+            <a:endParaRPr lang="en-US"/>
+          </a:p>
+        </p:txBody>
+      </p:sp>
+      <p:sp>
+        <p:nvSpPr>
+          <p:cNvPr id="3" name="Content Placeholder 2"/>
+          <p:cNvSpPr>
+            <a:spLocks noGrp="1"/>
+          </p:cNvSpPr>
+          <p:nvPr>
+            <p:ph sz="half" idx="1"/>
+          </p:nvPr>
+        </p:nvSpPr>
+        <p:spPr>
+          <a:xfrm>
+            <a:off x="457200" y="1600200"/>
+            <a:ext cx="3048000" cy="4525963"/>
+          </a:xfrm>
+        </p:spPr>
+        <p:txBody>
+          <a:bodyPr/>
+          <a:lstStyle>
+            <a:lvl1pPr>
+              <a:defRPr sz="2800"/>
+            </a:lvl1pPr>
+            <a:lvl2pPr>
+              <a:defRPr sz="2400"/>
+            </a:lvl2pPr>
+            <a:lvl3pPr>
+              <a:defRPr sz="2000"/>
+            </a:lvl3pPr>
+            <a:lvl4pPr>
+              <a:defRPr sz="1800"/>
+            </a:lvl4pPr>
+            <a:lvl5pPr>
+              <a:defRPr sz="1800"/>
+            </a:lvl5pPr>
+            <a:lvl6pPr>
+              <a:defRPr sz="1800"/>
+            </a:lvl6pPr>
+            <a:lvl7pPr>
+              <a:defRPr sz="1800"/>
+            </a:lvl7pPr>
+            <a:lvl8pPr>
+              <a:defRPr sz="1800"/>
+            </a:lvl8pPr>
+            <a:lvl9pPr>
+              <a:defRPr sz="1800"/>
+            </a:lvl9pPr>
+          </a:lstStyle>
+          <a:p>
+            <a:pPr lvl="0"/>
+            <a:r>
+              <a:rPr lang="en-US" dirty="0" smtClean="0"/>
+              <a:t>Click to edit Master text styles</a:t>
+            </a:r>
+          </a:p>
+          <a:p>
+            <a:pPr lvl="1"/>
+            <a:r>
+              <a:rPr lang="en-US" dirty="0" smtClean="0"/>
+              <a:t>Second level</a:t>
+            </a:r>
+          </a:p>
+          <a:p>
+            <a:pPr lvl="2"/>
+            <a:r>
+              <a:rPr lang="en-US" dirty="0" smtClean="0"/>
+              <a:t>Third level</a:t>
+            </a:r>
+          </a:p>
+          <a:p>
+            <a:pPr lvl="3"/>
+            <a:r>
+              <a:rPr lang="en-US" dirty="0" smtClean="0"/>
+              <a:t>Fourth level</a:t>
+            </a:r>
+          </a:p>
+          <a:p>
+            <a:pPr lvl="4"/>
+            <a:r>
+              <a:rPr lang="en-US" dirty="0" smtClean="0"/>
+              <a:t>Fifth level</a:t>
+            </a:r>
+            <a:endParaRPr lang="en-US" dirty="0"/>
+          </a:p>
+        </p:txBody>
+      </p:sp>
+      <p:sp>
+        <p:nvSpPr>
+          <p:cNvPr id="4" name="Content Placeholder 3"/>
+          <p:cNvSpPr>
+            <a:spLocks noGrp="1"/>
+          </p:cNvSpPr>
+          <p:nvPr>
+            <p:ph sz="half" idx="2"/>
+          </p:nvPr>
+        </p:nvSpPr>
+        <p:spPr>
+          <a:xfrm>
+            <a:off x="3657600" y="1600200"/>
+            <a:ext cx="5029200" cy="4525963"/>
+          </a:xfrm>
+        </p:spPr>
+        <p:txBody>
+          <a:bodyPr/>
+          <a:lstStyle>
+            <a:lvl1pPr>
+              <a:defRPr sz="2800"/>
+            </a:lvl1pPr>
+            <a:lvl2pPr>
+              <a:defRPr sz="2400"/>
+            </a:lvl2pPr>
+            <a:lvl3pPr>
+              <a:defRPr sz="2000"/>
+            </a:lvl3pPr>
+            <a:lvl4pPr>
+              <a:defRPr sz="1800"/>
+            </a:lvl4pPr>
+            <a:lvl5pPr>
+              <a:defRPr sz="1800"/>
+            </a:lvl5pPr>
+            <a:lvl6pPr>
+              <a:defRPr sz="1800"/>
+            </a:lvl6pPr>
+            <a:lvl7pPr>
+              <a:defRPr sz="1800"/>
+            </a:lvl7pPr>
+            <a:lvl8pPr>
+              <a:defRPr sz="1800"/>
+            </a:lvl8pPr>
+            <a:lvl9pPr>
+              <a:defRPr sz="1800"/>
+            </a:lvl9pPr>
+          </a:lstStyle>
+          <a:p>
+            <a:pPr lvl="0"/>
+            <a:r>
+              <a:rPr lang="en-US" dirty="0" smtClean="0"/>
+              <a:t>Click to edit Master text styles</a:t>
+            </a:r>
+          </a:p>
+          <a:p>
+            <a:pPr lvl="1"/>
+            <a:r>
+              <a:rPr lang="en-US" dirty="0" smtClean="0"/>
+              <a:t>Second level</a:t>
+            </a:r>
+          </a:p>
+          <a:p>
+            <a:pPr lvl="2"/>
+            <a:r>
+              <a:rPr lang="en-US" dirty="0" smtClean="0"/>
+              <a:t>Third level</a:t>
+            </a:r>
+          </a:p>
+          <a:p>
+            <a:pPr lvl="3"/>
+            <a:r>
+              <a:rPr lang="en-US" dirty="0" smtClean="0"/>
+              <a:t>Fourth level</a:t>
+            </a:r>
+          </a:p>
+          <a:p>
+            <a:pPr lvl="4"/>
+            <a:r>
+              <a:rPr lang="en-US" dirty="0" smtClean="0"/>
+              <a:t>Fifth level</a:t>
+            </a:r>
+            <a:endParaRPr lang="en-US" dirty="0"/>
+          </a:p>
+        </p:txBody>
+      </p:sp>
+      <p:sp>
+        <p:nvSpPr>
+          <p:cNvPr id="7" name="Slide Number Placeholder 6"/>
+          <p:cNvSpPr>
+            <a:spLocks noGrp="1"/>
+          </p:cNvSpPr>
+          <p:nvPr>
+            <p:ph type="sldNum" sz="quarter" idx="12"/>
+          </p:nvPr>
+        </p:nvSpPr>
+        <p:spPr/>
+        <p:txBody>
+          <a:bodyPr/>
+          <a:lstStyle/>
+          <a:p>
+            <a:fld id="{6F99343D-46AE-4C14-8296-D13D823691DC}" type="slidenum">
+              <a:rPr lang="en-US" smtClean="0"/>
+              <a:pPr/>
+              <a:t>‹#›</a:t>
+            </a:fld>
+            <a:endParaRPr lang="en-US" dirty="0"/>
+          </a:p>
+        </p:txBody>
+      </p:sp>
+    </p:spTree>
+  </p:cSld>
+  <p:clrMapOvr>
+    <a:masterClrMapping/>
+  </p:clrMapOvr>
+</p:sldLayout>
+</file>
+
+<file path=ppt/slideLayouts/slideLayout7.xml><?xml version="1.0" encoding="utf-8"?>
 <p:sldLayout xmlns:a="http://schemas.openxmlformats.org/drawingml/2006/main" xmlns:r="http://schemas.openxmlformats.org/officeDocument/2006/relationships" xmlns:p="http://schemas.openxmlformats.org/presentationml/2006/main" type="twoTxTwoObj" preserve="1">
   <p:cSld name="Comparison">
     <p:spTree>
@@ -2020,7 +2942,7 @@
 </p:sldLayout>
 </file>
 
-<file path=ppt/slideLayouts/slideLayout6.xml><?xml version="1.0" encoding="utf-8"?>
+<file path=ppt/slideLayouts/slideLayout8.xml><?xml version="1.0" encoding="utf-8"?>
 <p:sldLayout xmlns:a="http://schemas.openxmlformats.org/drawingml/2006/main" xmlns:r="http://schemas.openxmlformats.org/officeDocument/2006/relationships" xmlns:p="http://schemas.openxmlformats.org/presentationml/2006/main" type="titleOnly" preserve="1">
   <p:cSld name="Title Only">
     <p:spTree>
@@ -2092,7 +3014,7 @@
 </p:sldLayout>
 </file>
 
-<file path=ppt/slideLayouts/slideLayout7.xml><?xml version="1.0" encoding="utf-8"?>
+<file path=ppt/slideLayouts/slideLayout9.xml><?xml version="1.0" encoding="utf-8"?>
 <p:sldLayout xmlns:a="http://schemas.openxmlformats.org/drawingml/2006/main" xmlns:r="http://schemas.openxmlformats.org/officeDocument/2006/relationships" xmlns:p="http://schemas.openxmlformats.org/presentationml/2006/main" type="blank" preserve="1">
   <p:cSld name="Blank">
     <p:spTree>
@@ -2112,444 +3034,6 @@
       <p:sp>
         <p:nvSpPr>
           <p:cNvPr id="4" name="Slide Number Placeholder 3"/>
-          <p:cNvSpPr>
-            <a:spLocks noGrp="1"/>
-          </p:cNvSpPr>
-          <p:nvPr>
-            <p:ph type="sldNum" sz="quarter" idx="12"/>
-          </p:nvPr>
-        </p:nvSpPr>
-        <p:spPr/>
-        <p:txBody>
-          <a:bodyPr/>
-          <a:lstStyle/>
-          <a:p>
-            <a:fld id="{6F99343D-46AE-4C14-8296-D13D823691DC}" type="slidenum">
-              <a:rPr lang="en-US" smtClean="0"/>
-              <a:pPr/>
-              <a:t>‹#›</a:t>
-            </a:fld>
-            <a:endParaRPr lang="en-US" dirty="0"/>
-          </a:p>
-        </p:txBody>
-      </p:sp>
-    </p:spTree>
-  </p:cSld>
-  <p:clrMapOvr>
-    <a:masterClrMapping/>
-  </p:clrMapOvr>
-</p:sldLayout>
-</file>
-
-<file path=ppt/slideLayouts/slideLayout8.xml><?xml version="1.0" encoding="utf-8"?>
-<p:sldLayout xmlns:a="http://schemas.openxmlformats.org/drawingml/2006/main" xmlns:r="http://schemas.openxmlformats.org/officeDocument/2006/relationships" xmlns:p="http://schemas.openxmlformats.org/presentationml/2006/main" type="objTx" preserve="1">
-  <p:cSld name="Content with Caption">
-    <p:spTree>
-      <p:nvGrpSpPr>
-        <p:cNvPr id="1" name=""/>
-        <p:cNvGrpSpPr/>
-        <p:nvPr/>
-      </p:nvGrpSpPr>
-      <p:grpSpPr>
-        <a:xfrm>
-          <a:off x="0" y="0"/>
-          <a:ext cx="0" cy="0"/>
-          <a:chOff x="0" y="0"/>
-          <a:chExt cx="0" cy="0"/>
-        </a:xfrm>
-      </p:grpSpPr>
-      <p:sp>
-        <p:nvSpPr>
-          <p:cNvPr id="2" name="Title 1"/>
-          <p:cNvSpPr>
-            <a:spLocks noGrp="1"/>
-          </p:cNvSpPr>
-          <p:nvPr>
-            <p:ph type="title"/>
-          </p:nvPr>
-        </p:nvSpPr>
-        <p:spPr>
-          <a:xfrm>
-            <a:off x="457200" y="273050"/>
-            <a:ext cx="3008313" cy="1162050"/>
-          </a:xfrm>
-        </p:spPr>
-        <p:txBody>
-          <a:bodyPr anchor="b"/>
-          <a:lstStyle>
-            <a:lvl1pPr algn="l">
-              <a:defRPr sz="2000" b="1"/>
-            </a:lvl1pPr>
-          </a:lstStyle>
-          <a:p>
-            <a:r>
-              <a:rPr lang="en-US" smtClean="0"/>
-              <a:t>Click to edit Master title style</a:t>
-            </a:r>
-            <a:endParaRPr lang="en-US"/>
-          </a:p>
-        </p:txBody>
-      </p:sp>
-      <p:sp>
-        <p:nvSpPr>
-          <p:cNvPr id="3" name="Content Placeholder 2"/>
-          <p:cNvSpPr>
-            <a:spLocks noGrp="1"/>
-          </p:cNvSpPr>
-          <p:nvPr>
-            <p:ph idx="1"/>
-          </p:nvPr>
-        </p:nvSpPr>
-        <p:spPr>
-          <a:xfrm>
-            <a:off x="3575050" y="273050"/>
-            <a:ext cx="5111750" cy="5853113"/>
-          </a:xfrm>
-        </p:spPr>
-        <p:txBody>
-          <a:bodyPr/>
-          <a:lstStyle>
-            <a:lvl1pPr>
-              <a:defRPr sz="3200"/>
-            </a:lvl1pPr>
-            <a:lvl2pPr>
-              <a:defRPr sz="2800"/>
-            </a:lvl2pPr>
-            <a:lvl3pPr>
-              <a:defRPr sz="2400"/>
-            </a:lvl3pPr>
-            <a:lvl4pPr>
-              <a:defRPr sz="2000"/>
-            </a:lvl4pPr>
-            <a:lvl5pPr>
-              <a:defRPr sz="2000"/>
-            </a:lvl5pPr>
-            <a:lvl6pPr>
-              <a:defRPr sz="2000"/>
-            </a:lvl6pPr>
-            <a:lvl7pPr>
-              <a:defRPr sz="2000"/>
-            </a:lvl7pPr>
-            <a:lvl8pPr>
-              <a:defRPr sz="2000"/>
-            </a:lvl8pPr>
-            <a:lvl9pPr>
-              <a:defRPr sz="2000"/>
-            </a:lvl9pPr>
-          </a:lstStyle>
-          <a:p>
-            <a:pPr lvl="0"/>
-            <a:r>
-              <a:rPr lang="en-US" smtClean="0"/>
-              <a:t>Click to edit Master text styles</a:t>
-            </a:r>
-          </a:p>
-          <a:p>
-            <a:pPr lvl="1"/>
-            <a:r>
-              <a:rPr lang="en-US" smtClean="0"/>
-              <a:t>Second level</a:t>
-            </a:r>
-          </a:p>
-          <a:p>
-            <a:pPr lvl="2"/>
-            <a:r>
-              <a:rPr lang="en-US" smtClean="0"/>
-              <a:t>Third level</a:t>
-            </a:r>
-          </a:p>
-          <a:p>
-            <a:pPr lvl="3"/>
-            <a:r>
-              <a:rPr lang="en-US" smtClean="0"/>
-              <a:t>Fourth level</a:t>
-            </a:r>
-          </a:p>
-          <a:p>
-            <a:pPr lvl="4"/>
-            <a:r>
-              <a:rPr lang="en-US" smtClean="0"/>
-              <a:t>Fifth level</a:t>
-            </a:r>
-            <a:endParaRPr lang="en-US"/>
-          </a:p>
-        </p:txBody>
-      </p:sp>
-      <p:sp>
-        <p:nvSpPr>
-          <p:cNvPr id="4" name="Text Placeholder 3"/>
-          <p:cNvSpPr>
-            <a:spLocks noGrp="1"/>
-          </p:cNvSpPr>
-          <p:nvPr>
-            <p:ph type="body" sz="half" idx="2"/>
-          </p:nvPr>
-        </p:nvSpPr>
-        <p:spPr>
-          <a:xfrm>
-            <a:off x="457200" y="1435100"/>
-            <a:ext cx="3008313" cy="4691063"/>
-          </a:xfrm>
-        </p:spPr>
-        <p:txBody>
-          <a:bodyPr/>
-          <a:lstStyle>
-            <a:lvl1pPr marL="0" indent="0">
-              <a:buNone/>
-              <a:defRPr sz="1400"/>
-            </a:lvl1pPr>
-            <a:lvl2pPr marL="457200" indent="0">
-              <a:buNone/>
-              <a:defRPr sz="1200"/>
-            </a:lvl2pPr>
-            <a:lvl3pPr marL="914400" indent="0">
-              <a:buNone/>
-              <a:defRPr sz="1000"/>
-            </a:lvl3pPr>
-            <a:lvl4pPr marL="1371600" indent="0">
-              <a:buNone/>
-              <a:defRPr sz="900"/>
-            </a:lvl4pPr>
-            <a:lvl5pPr marL="1828800" indent="0">
-              <a:buNone/>
-              <a:defRPr sz="900"/>
-            </a:lvl5pPr>
-            <a:lvl6pPr marL="2286000" indent="0">
-              <a:buNone/>
-              <a:defRPr sz="900"/>
-            </a:lvl6pPr>
-            <a:lvl7pPr marL="2743200" indent="0">
-              <a:buNone/>
-              <a:defRPr sz="900"/>
-            </a:lvl7pPr>
-            <a:lvl8pPr marL="3200400" indent="0">
-              <a:buNone/>
-              <a:defRPr sz="900"/>
-            </a:lvl8pPr>
-            <a:lvl9pPr marL="3657600" indent="0">
-              <a:buNone/>
-              <a:defRPr sz="900"/>
-            </a:lvl9pPr>
-          </a:lstStyle>
-          <a:p>
-            <a:pPr lvl="0"/>
-            <a:r>
-              <a:rPr lang="en-US" smtClean="0"/>
-              <a:t>Click to edit Master text styles</a:t>
-            </a:r>
-          </a:p>
-        </p:txBody>
-      </p:sp>
-      <p:sp>
-        <p:nvSpPr>
-          <p:cNvPr id="7" name="Slide Number Placeholder 6"/>
-          <p:cNvSpPr>
-            <a:spLocks noGrp="1"/>
-          </p:cNvSpPr>
-          <p:nvPr>
-            <p:ph type="sldNum" sz="quarter" idx="12"/>
-          </p:nvPr>
-        </p:nvSpPr>
-        <p:spPr/>
-        <p:txBody>
-          <a:bodyPr/>
-          <a:lstStyle/>
-          <a:p>
-            <a:fld id="{6F99343D-46AE-4C14-8296-D13D823691DC}" type="slidenum">
-              <a:rPr lang="en-US" smtClean="0"/>
-              <a:pPr/>
-              <a:t>‹#›</a:t>
-            </a:fld>
-            <a:endParaRPr lang="en-US" dirty="0"/>
-          </a:p>
-        </p:txBody>
-      </p:sp>
-    </p:spTree>
-  </p:cSld>
-  <p:clrMapOvr>
-    <a:masterClrMapping/>
-  </p:clrMapOvr>
-</p:sldLayout>
-</file>
-
-<file path=ppt/slideLayouts/slideLayout9.xml><?xml version="1.0" encoding="utf-8"?>
-<p:sldLayout xmlns:a="http://schemas.openxmlformats.org/drawingml/2006/main" xmlns:r="http://schemas.openxmlformats.org/officeDocument/2006/relationships" xmlns:p="http://schemas.openxmlformats.org/presentationml/2006/main" type="picTx" preserve="1">
-  <p:cSld name="Picture with Caption">
-    <p:spTree>
-      <p:nvGrpSpPr>
-        <p:cNvPr id="1" name=""/>
-        <p:cNvGrpSpPr/>
-        <p:nvPr/>
-      </p:nvGrpSpPr>
-      <p:grpSpPr>
-        <a:xfrm>
-          <a:off x="0" y="0"/>
-          <a:ext cx="0" cy="0"/>
-          <a:chOff x="0" y="0"/>
-          <a:chExt cx="0" cy="0"/>
-        </a:xfrm>
-      </p:grpSpPr>
-      <p:sp>
-        <p:nvSpPr>
-          <p:cNvPr id="2" name="Title 1"/>
-          <p:cNvSpPr>
-            <a:spLocks noGrp="1"/>
-          </p:cNvSpPr>
-          <p:nvPr>
-            <p:ph type="title"/>
-          </p:nvPr>
-        </p:nvSpPr>
-        <p:spPr>
-          <a:xfrm>
-            <a:off x="1792288" y="4800600"/>
-            <a:ext cx="5486400" cy="566738"/>
-          </a:xfrm>
-        </p:spPr>
-        <p:txBody>
-          <a:bodyPr anchor="b"/>
-          <a:lstStyle>
-            <a:lvl1pPr algn="l">
-              <a:defRPr sz="2000" b="1"/>
-            </a:lvl1pPr>
-          </a:lstStyle>
-          <a:p>
-            <a:r>
-              <a:rPr lang="en-US" smtClean="0"/>
-              <a:t>Click to edit Master title style</a:t>
-            </a:r>
-            <a:endParaRPr lang="en-US"/>
-          </a:p>
-        </p:txBody>
-      </p:sp>
-      <p:sp>
-        <p:nvSpPr>
-          <p:cNvPr id="3" name="Picture Placeholder 2"/>
-          <p:cNvSpPr>
-            <a:spLocks noGrp="1"/>
-          </p:cNvSpPr>
-          <p:nvPr>
-            <p:ph type="pic" idx="1"/>
-          </p:nvPr>
-        </p:nvSpPr>
-        <p:spPr>
-          <a:xfrm>
-            <a:off x="1792288" y="612775"/>
-            <a:ext cx="5486400" cy="4114800"/>
-          </a:xfrm>
-        </p:spPr>
-        <p:txBody>
-          <a:bodyPr/>
-          <a:lstStyle>
-            <a:lvl1pPr marL="0" indent="0">
-              <a:buNone/>
-              <a:defRPr sz="3200"/>
-            </a:lvl1pPr>
-            <a:lvl2pPr marL="457200" indent="0">
-              <a:buNone/>
-              <a:defRPr sz="2800"/>
-            </a:lvl2pPr>
-            <a:lvl3pPr marL="914400" indent="0">
-              <a:buNone/>
-              <a:defRPr sz="2400"/>
-            </a:lvl3pPr>
-            <a:lvl4pPr marL="1371600" indent="0">
-              <a:buNone/>
-              <a:defRPr sz="2000"/>
-            </a:lvl4pPr>
-            <a:lvl5pPr marL="1828800" indent="0">
-              <a:buNone/>
-              <a:defRPr sz="2000"/>
-            </a:lvl5pPr>
-            <a:lvl6pPr marL="2286000" indent="0">
-              <a:buNone/>
-              <a:defRPr sz="2000"/>
-            </a:lvl6pPr>
-            <a:lvl7pPr marL="2743200" indent="0">
-              <a:buNone/>
-              <a:defRPr sz="2000"/>
-            </a:lvl7pPr>
-            <a:lvl8pPr marL="3200400" indent="0">
-              <a:buNone/>
-              <a:defRPr sz="2000"/>
-            </a:lvl8pPr>
-            <a:lvl9pPr marL="3657600" indent="0">
-              <a:buNone/>
-              <a:defRPr sz="2000"/>
-            </a:lvl9pPr>
-          </a:lstStyle>
-          <a:p>
-            <a:endParaRPr lang="en-US" dirty="0"/>
-          </a:p>
-        </p:txBody>
-      </p:sp>
-      <p:sp>
-        <p:nvSpPr>
-          <p:cNvPr id="4" name="Text Placeholder 3"/>
-          <p:cNvSpPr>
-            <a:spLocks noGrp="1"/>
-          </p:cNvSpPr>
-          <p:nvPr>
-            <p:ph type="body" sz="half" idx="2"/>
-          </p:nvPr>
-        </p:nvSpPr>
-        <p:spPr>
-          <a:xfrm>
-            <a:off x="1792288" y="5367338"/>
-            <a:ext cx="5486400" cy="804862"/>
-          </a:xfrm>
-        </p:spPr>
-        <p:txBody>
-          <a:bodyPr/>
-          <a:lstStyle>
-            <a:lvl1pPr marL="0" indent="0">
-              <a:buNone/>
-              <a:defRPr sz="1400"/>
-            </a:lvl1pPr>
-            <a:lvl2pPr marL="457200" indent="0">
-              <a:buNone/>
-              <a:defRPr sz="1200"/>
-            </a:lvl2pPr>
-            <a:lvl3pPr marL="914400" indent="0">
-              <a:buNone/>
-              <a:defRPr sz="1000"/>
-            </a:lvl3pPr>
-            <a:lvl4pPr marL="1371600" indent="0">
-              <a:buNone/>
-              <a:defRPr sz="900"/>
-            </a:lvl4pPr>
-            <a:lvl5pPr marL="1828800" indent="0">
-              <a:buNone/>
-              <a:defRPr sz="900"/>
-            </a:lvl5pPr>
-            <a:lvl6pPr marL="2286000" indent="0">
-              <a:buNone/>
-              <a:defRPr sz="900"/>
-            </a:lvl6pPr>
-            <a:lvl7pPr marL="2743200" indent="0">
-              <a:buNone/>
-              <a:defRPr sz="900"/>
-            </a:lvl7pPr>
-            <a:lvl8pPr marL="3200400" indent="0">
-              <a:buNone/>
-              <a:defRPr sz="900"/>
-            </a:lvl8pPr>
-            <a:lvl9pPr marL="3657600" indent="0">
-              <a:buNone/>
-              <a:defRPr sz="900"/>
-            </a:lvl9pPr>
-          </a:lstStyle>
-          <a:p>
-            <a:pPr lvl="0"/>
-            <a:r>
-              <a:rPr lang="en-US" smtClean="0"/>
-              <a:t>Click to edit Master text styles</a:t>
-            </a:r>
-          </a:p>
-        </p:txBody>
-      </p:sp>
-      <p:sp>
-        <p:nvSpPr>
-          <p:cNvPr id="7" name="Slide Number Placeholder 6"/>
           <p:cNvSpPr>
             <a:spLocks noGrp="1"/>
           </p:cNvSpPr>
@@ -2791,7 +3275,7 @@
           <p:nvPr userDrawn="1"/>
         </p:nvPicPr>
         <p:blipFill>
-          <a:blip r:embed="rId13" cstate="print"/>
+          <a:blip r:embed="rId15" cstate="print"/>
           <a:srcRect/>
           <a:stretch>
             <a:fillRect/>
@@ -2831,7 +3315,7 @@
             <p:nvPr userDrawn="1"/>
           </p:nvPicPr>
           <p:blipFill>
-            <a:blip r:embed="rId14" cstate="print"/>
+            <a:blip r:embed="rId16" cstate="print"/>
             <a:srcRect/>
             <a:stretch>
               <a:fillRect/>
@@ -2857,7 +3341,7 @@
             <p:nvPr userDrawn="1"/>
           </p:nvPicPr>
           <p:blipFill>
-            <a:blip r:embed="rId15" cstate="print"/>
+            <a:blip r:embed="rId17" cstate="print"/>
             <a:srcRect/>
             <a:stretch>
               <a:fillRect/>
@@ -2889,13 +3373,15 @@
     <p:sldLayoutId id="2147483650" r:id="rId2"/>
     <p:sldLayoutId id="2147483651" r:id="rId3"/>
     <p:sldLayoutId id="2147483652" r:id="rId4"/>
-    <p:sldLayoutId id="2147483653" r:id="rId5"/>
-    <p:sldLayoutId id="2147483654" r:id="rId6"/>
-    <p:sldLayoutId id="2147483655" r:id="rId7"/>
-    <p:sldLayoutId id="2147483656" r:id="rId8"/>
-    <p:sldLayoutId id="2147483657" r:id="rId9"/>
-    <p:sldLayoutId id="2147483658" r:id="rId10"/>
-    <p:sldLayoutId id="2147483659" r:id="rId11"/>
+    <p:sldLayoutId id="2147483660" r:id="rId5"/>
+    <p:sldLayoutId id="2147483661" r:id="rId6"/>
+    <p:sldLayoutId id="2147483653" r:id="rId7"/>
+    <p:sldLayoutId id="2147483654" r:id="rId8"/>
+    <p:sldLayoutId id="2147483655" r:id="rId9"/>
+    <p:sldLayoutId id="2147483656" r:id="rId10"/>
+    <p:sldLayoutId id="2147483657" r:id="rId11"/>
+    <p:sldLayoutId id="2147483658" r:id="rId12"/>
+    <p:sldLayoutId id="2147483659" r:id="rId13"/>
   </p:sldLayoutIdLst>
   <p:hf hdr="0" ftr="0" dt="0"/>
   <p:txStyles>
@@ -3348,8 +3834,27 @@
             </a:r>
             <a:r>
               <a:rPr lang="en-US" dirty="0" smtClean="0"/>
-              <a:t> 2.5.1</a:t>
-            </a:r>
+              <a:t> </a:t>
+            </a:r>
+            <a:r>
+              <a:rPr lang="en-US" dirty="0" smtClean="0"/>
+              <a:t>2.5.1</a:t>
+            </a:r>
+          </a:p>
+          <a:p>
+            <a:r>
+              <a:rPr lang="en-US" dirty="0" smtClean="0">
+                <a:hlinkClick r:id="rId2"/>
+              </a:rPr>
+              <a:t>http://cxf.apache.org</a:t>
+            </a:r>
+            <a:endParaRPr lang="en-US" dirty="0" smtClean="0"/>
+          </a:p>
+          <a:p>
+            <a:pPr>
+              <a:buNone/>
+            </a:pPr>
+            <a:endParaRPr lang="en-US" dirty="0" smtClean="0"/>
           </a:p>
           <a:p>
             <a:pPr lvl="1"/>
@@ -3435,7 +3940,7 @@
       </p:sp>
       <p:sp>
         <p:nvSpPr>
-          <p:cNvPr id="3" name="Content Placeholder 2"/>
+          <p:cNvPr id="6" name="Content Placeholder 5"/>
           <p:cNvSpPr>
             <a:spLocks noGrp="1"/>
           </p:cNvSpPr>
@@ -3448,29 +3953,60 @@
           <a:bodyPr/>
           <a:lstStyle/>
           <a:p>
-            <a:endParaRPr lang="en-US"/>
-          </a:p>
-        </p:txBody>
-      </p:sp>
-      <p:sp>
-        <p:nvSpPr>
-          <p:cNvPr id="4" name="Content Placeholder 3"/>
-          <p:cNvSpPr>
-            <a:spLocks noGrp="1"/>
-          </p:cNvSpPr>
+            <a:r>
+              <a:rPr lang="en-US" dirty="0" smtClean="0"/>
+              <a:t>Open source web single sign-on solution</a:t>
+            </a:r>
+          </a:p>
+          <a:p>
+            <a:r>
+              <a:rPr lang="en-US" dirty="0" smtClean="0"/>
+              <a:t>Widely adopted </a:t>
+            </a:r>
+            <a:r>
+              <a:rPr lang="en-US" dirty="0" smtClean="0"/>
+              <a:t>by post-secondary education industry</a:t>
+            </a:r>
+            <a:endParaRPr lang="en-US" dirty="0" smtClean="0"/>
+          </a:p>
+          <a:p>
+            <a:r>
+              <a:rPr lang="en-US" dirty="0" smtClean="0"/>
+              <a:t>Implements </a:t>
+            </a:r>
+            <a:r>
+              <a:rPr lang="en-US" dirty="0" smtClean="0">
+                <a:hlinkClick r:id="rId2"/>
+              </a:rPr>
+              <a:t>SAML Web Browser SSO Profile</a:t>
+            </a:r>
+            <a:endParaRPr lang="en-US" dirty="0" smtClean="0"/>
+          </a:p>
+        </p:txBody>
+      </p:sp>
+      <p:pic>
+        <p:nvPicPr>
+          <p:cNvPr id="8" name="Content Placeholder 7" descr="shibboleth-featured.jpg"/>
+          <p:cNvPicPr>
+            <a:picLocks noGrp="1" noChangeAspect="1"/>
+          </p:cNvPicPr>
           <p:nvPr>
             <p:ph sz="half" idx="2"/>
           </p:nvPr>
-        </p:nvSpPr>
-        <p:spPr/>
-        <p:txBody>
-          <a:bodyPr/>
-          <a:lstStyle/>
-          <a:p>
-            <a:endParaRPr lang="en-US"/>
-          </a:p>
-        </p:txBody>
-      </p:sp>
+        </p:nvPicPr>
+        <p:blipFill>
+          <a:blip r:embed="rId3" cstate="print"/>
+          <a:stretch>
+            <a:fillRect/>
+          </a:stretch>
+        </p:blipFill>
+        <p:spPr>
+          <a:xfrm>
+            <a:off x="5638800" y="2339181"/>
+            <a:ext cx="3048000" cy="3048000"/>
+          </a:xfrm>
+        </p:spPr>
+      </p:pic>
       <p:sp>
         <p:nvSpPr>
           <p:cNvPr id="5" name="Slide Number Placeholder 4"/>
@@ -3522,30 +4058,90 @@
       </p:grpSpPr>
       <p:sp>
         <p:nvSpPr>
-          <p:cNvPr id="2" name="Title 1"/>
-          <p:cNvSpPr>
-            <a:spLocks noGrp="1"/>
-          </p:cNvSpPr>
-          <p:nvPr>
-            <p:ph type="ctrTitle"/>
-          </p:nvPr>
-        </p:nvSpPr>
-        <p:spPr/>
-        <p:txBody>
-          <a:bodyPr/>
-          <a:lstStyle/>
-          <a:p>
-            <a:r>
-              <a:rPr lang="en-US" dirty="0" smtClean="0"/>
-              <a:t>Provider overview</a:t>
-            </a:r>
-            <a:endParaRPr lang="en-US" dirty="0"/>
-          </a:p>
-        </p:txBody>
-      </p:sp>
-      <p:sp>
-        <p:nvSpPr>
-          <p:cNvPr id="3" name="Slide Number Placeholder 2"/>
+          <p:cNvPr id="5" name="Content Placeholder 4"/>
+          <p:cNvSpPr>
+            <a:spLocks noGrp="1"/>
+          </p:cNvSpPr>
+          <p:nvPr>
+            <p:ph idx="1"/>
+          </p:nvPr>
+        </p:nvSpPr>
+        <p:spPr>
+          <a:xfrm>
+            <a:off x="457200" y="609600"/>
+            <a:ext cx="8229600" cy="5516563"/>
+          </a:xfrm>
+        </p:spPr>
+        <p:txBody>
+          <a:bodyPr/>
+          <a:lstStyle/>
+          <a:p>
+            <a:r>
+              <a:rPr lang="en-US" dirty="0" smtClean="0"/>
+              <a:t>Shibboleth Home:</a:t>
+            </a:r>
+          </a:p>
+          <a:p>
+            <a:pPr>
+              <a:buNone/>
+            </a:pPr>
+            <a:r>
+              <a:rPr lang="en-US" dirty="0" smtClean="0"/>
+              <a:t>	</a:t>
+            </a:r>
+            <a:r>
+              <a:rPr lang="en-US" dirty="0" smtClean="0">
+                <a:hlinkClick r:id="rId2"/>
+              </a:rPr>
+              <a:t>http://shibboleth.internet2.edu</a:t>
+            </a:r>
+            <a:r>
+              <a:rPr lang="en-US" dirty="0" smtClean="0">
+                <a:hlinkClick r:id="rId2"/>
+              </a:rPr>
+              <a:t>/</a:t>
+            </a:r>
+            <a:endParaRPr lang="en-US" dirty="0" smtClean="0"/>
+          </a:p>
+          <a:p>
+            <a:r>
+              <a:rPr lang="en-US" dirty="0" smtClean="0"/>
+              <a:t>SAML Web Browser SSO Profile:</a:t>
+            </a:r>
+          </a:p>
+          <a:p>
+            <a:pPr>
+              <a:buNone/>
+            </a:pPr>
+            <a:r>
+              <a:rPr lang="en-US" dirty="0" smtClean="0"/>
+              <a:t>	</a:t>
+            </a:r>
+            <a:r>
+              <a:rPr lang="en-US" dirty="0" smtClean="0">
+                <a:hlinkClick r:id="rId3"/>
+              </a:rPr>
+              <a:t>http://</a:t>
+            </a:r>
+            <a:r>
+              <a:rPr lang="en-US" dirty="0" smtClean="0">
+                <a:hlinkClick r:id="rId3"/>
+              </a:rPr>
+              <a:t>www.oasis-open.org/committees/download.php/35389/sstc-saml-profiles-errata-2.0-wd-06-diff.pdf</a:t>
+            </a:r>
+            <a:endParaRPr lang="en-US" dirty="0" smtClean="0"/>
+          </a:p>
+          <a:p>
+            <a:pPr>
+              <a:buNone/>
+            </a:pPr>
+            <a:endParaRPr lang="en-US" dirty="0"/>
+          </a:p>
+        </p:txBody>
+      </p:sp>
+      <p:sp>
+        <p:nvSpPr>
+          <p:cNvPr id="2" name="Slide Number Placeholder 1"/>
           <p:cNvSpPr>
             <a:spLocks noGrp="1"/>
           </p:cNvSpPr>
@@ -3572,13 +4168,6 @@
   <p:clrMapOvr>
     <a:masterClrMapping/>
   </p:clrMapOvr>
-  <p:timing>
-    <p:tnLst>
-      <p:par>
-        <p:cTn id="1" dur="indefinite" restart="never" nodeType="tmRoot"/>
-      </p:par>
-    </p:tnLst>
-  </p:timing>
 </p:sld>
 </file>
 
@@ -3616,7 +4205,7 @@
           <a:p>
             <a:r>
               <a:rPr lang="en-US" dirty="0" smtClean="0"/>
-              <a:t>Translation layer</a:t>
+              <a:t>Provider overview</a:t>
             </a:r>
             <a:endParaRPr lang="en-US" dirty="0"/>
           </a:p>
@@ -3651,6 +4240,13 @@
   <p:clrMapOvr>
     <a:masterClrMapping/>
   </p:clrMapOvr>
+  <p:timing>
+    <p:tnLst>
+      <p:par>
+        <p:cTn id="1" dur="indefinite" restart="never" nodeType="tmRoot"/>
+      </p:par>
+    </p:tnLst>
+  </p:timing>
 </p:sld>
 </file>
 
@@ -3673,7 +4269,30 @@
       </p:grpSpPr>
       <p:sp>
         <p:nvSpPr>
-          <p:cNvPr id="2" name="Slide Number Placeholder 1"/>
+          <p:cNvPr id="2" name="Title 1"/>
+          <p:cNvSpPr>
+            <a:spLocks noGrp="1"/>
+          </p:cNvSpPr>
+          <p:nvPr>
+            <p:ph type="ctrTitle"/>
+          </p:nvPr>
+        </p:nvSpPr>
+        <p:spPr/>
+        <p:txBody>
+          <a:bodyPr/>
+          <a:lstStyle/>
+          <a:p>
+            <a:r>
+              <a:rPr lang="en-US" dirty="0" smtClean="0"/>
+              <a:t>Translation layer</a:t>
+            </a:r>
+            <a:endParaRPr lang="en-US" dirty="0"/>
+          </a:p>
+        </p:txBody>
+      </p:sp>
+      <p:sp>
+        <p:nvSpPr>
+          <p:cNvPr id="3" name="Slide Number Placeholder 2"/>
           <p:cNvSpPr>
             <a:spLocks noGrp="1"/>
           </p:cNvSpPr>
@@ -3692,25 +4311,6 @@
               <a:t>14</a:t>
             </a:fld>
             <a:endParaRPr lang="en-US" dirty="0"/>
-          </a:p>
-        </p:txBody>
-      </p:sp>
-      <p:sp>
-        <p:nvSpPr>
-          <p:cNvPr id="3" name="Title 2"/>
-          <p:cNvSpPr>
-            <a:spLocks noGrp="1"/>
-          </p:cNvSpPr>
-          <p:nvPr>
-            <p:ph type="ctrTitle"/>
-          </p:nvPr>
-        </p:nvSpPr>
-        <p:spPr/>
-        <p:txBody>
-          <a:bodyPr/>
-          <a:lstStyle/>
-          <a:p>
-            <a:endParaRPr lang="en-US"/>
           </a:p>
         </p:txBody>
       </p:sp>
@@ -4092,9 +4692,6 @@
               </a:rPr>
               <a:t>Upgrade schedule flexibility</a:t>
             </a:r>
-            <a:endParaRPr lang="en-US" dirty="0" smtClean="0">
-              <a:latin typeface="Trebuchet MS" pitchFamily="34" charset="0"/>
-            </a:endParaRPr>
           </a:p>
           <a:p>
             <a:r>
@@ -4117,29 +4714,8 @@
               <a:rPr lang="en-US" dirty="0" smtClean="0">
                 <a:latin typeface="Trebuchet MS" pitchFamily="34" charset="0"/>
               </a:rPr>
-              <a:t>TokenProvider</a:t>
-            </a:r>
-            <a:r>
-              <a:rPr lang="en-US" dirty="0" smtClean="0">
-                <a:latin typeface="Trebuchet MS" pitchFamily="34" charset="0"/>
-              </a:rPr>
-              <a:t> and </a:t>
-            </a:r>
-            <a:r>
-              <a:rPr lang="en-US" dirty="0" smtClean="0">
-                <a:latin typeface="Trebuchet MS" pitchFamily="34" charset="0"/>
-              </a:rPr>
-              <a:t>DataServerAbstraction</a:t>
-            </a:r>
-            <a:r>
-              <a:rPr lang="en-US" dirty="0" smtClean="0">
-                <a:latin typeface="Trebuchet MS" pitchFamily="34" charset="0"/>
-              </a:rPr>
-              <a:t> interfaces</a:t>
-            </a:r>
-            <a:endParaRPr lang="en-US" dirty="0" smtClean="0">
-              <a:latin typeface="Trebuchet MS" pitchFamily="34" charset="0"/>
-            </a:endParaRPr>
+              <a:t>TokenProvider and DataServerAbstraction interfaces</a:t>
+            </a:r>
           </a:p>
         </p:txBody>
       </p:sp>
@@ -4319,8 +4895,8 @@
         </p:blipFill>
         <p:spPr>
           <a:xfrm>
-            <a:off x="685800" y="2209800"/>
-            <a:ext cx="2667000" cy="2607251"/>
+            <a:off x="685800" y="2362200"/>
+            <a:ext cx="2819400" cy="2756236"/>
           </a:xfrm>
         </p:spPr>
       </p:pic>
@@ -4334,12 +4910,7 @@
             <p:ph sz="half" idx="2"/>
           </p:nvPr>
         </p:nvSpPr>
-        <p:spPr>
-          <a:xfrm>
-            <a:off x="3733800" y="1600200"/>
-            <a:ext cx="4953000" cy="4525963"/>
-          </a:xfrm>
-        </p:spPr>
+        <p:spPr/>
         <p:txBody>
           <a:bodyPr>
             <a:normAutofit/>
@@ -4471,8 +5042,8 @@
         </p:blipFill>
         <p:spPr>
           <a:xfrm>
-            <a:off x="1219200" y="1676400"/>
-            <a:ext cx="1882054" cy="3450432"/>
+            <a:off x="990600" y="1524000"/>
+            <a:ext cx="1996354" cy="3659982"/>
           </a:xfrm>
         </p:spPr>
       </p:pic>
@@ -4486,12 +5057,7 @@
             <p:ph sz="half" idx="2"/>
           </p:nvPr>
         </p:nvSpPr>
-        <p:spPr>
-          <a:xfrm>
-            <a:off x="3733800" y="1600200"/>
-            <a:ext cx="4953000" cy="4525963"/>
-          </a:xfrm>
-        </p:spPr>
+        <p:spPr/>
         <p:txBody>
           <a:bodyPr/>
           <a:lstStyle/>
@@ -4504,7 +5070,19 @@
           <a:p>
             <a:r>
               <a:rPr lang="en-US" dirty="0" smtClean="0"/>
-              <a:t>Meteor developed using JDK 1.6.0 update 26</a:t>
+              <a:t>Meteor developed using JDK 1.6.0 update </a:t>
+            </a:r>
+            <a:r>
+              <a:rPr lang="en-US" dirty="0" smtClean="0"/>
+              <a:t>26</a:t>
+            </a:r>
+          </a:p>
+          <a:p>
+            <a:r>
+              <a:rPr lang="en-US" dirty="0" smtClean="0">
+                <a:hlinkClick r:id="rId4"/>
+              </a:rPr>
+              <a:t>http://www.oracle.com/technetwork/java/javase/overview/index.html</a:t>
             </a:r>
             <a:endParaRPr lang="en-US" dirty="0"/>
           </a:p>
@@ -4604,20 +5182,13 @@
           <a:bodyPr/>
           <a:lstStyle/>
           <a:p>
-            <a:pPr>
-              <a:buNone/>
-            </a:pPr>
             <a:r>
               <a:rPr lang="en-US" dirty="0" smtClean="0"/>
               <a:t>Build and </a:t>
             </a:r>
             <a:r>
               <a:rPr lang="en-US" u="sng" dirty="0" smtClean="0"/>
-              <a:t>d</a:t>
-            </a:r>
-            <a:r>
-              <a:rPr lang="en-US" u="sng" dirty="0" smtClean="0"/>
-              <a:t>ependency management tool</a:t>
+              <a:t>dependency management tool</a:t>
             </a:r>
             <a:r>
               <a:rPr lang="en-US" dirty="0" smtClean="0"/>
@@ -4648,7 +5219,27 @@
               <a:rPr lang="en-US" dirty="0" smtClean="0">
                 <a:latin typeface="Trebuchet MS" pitchFamily="34" charset="0"/>
               </a:rPr>
-              <a:t>Uniform directory structure across all Maven projects</a:t>
+              <a:t>Uniform directory structure across all Maven </a:t>
+            </a:r>
+            <a:r>
+              <a:rPr lang="en-US" dirty="0" smtClean="0">
+                <a:latin typeface="Trebuchet MS" pitchFamily="34" charset="0"/>
+              </a:rPr>
+              <a:t>projects</a:t>
+            </a:r>
+          </a:p>
+          <a:p>
+            <a:r>
+              <a:rPr lang="en-US" dirty="0" smtClean="0">
+                <a:hlinkClick r:id="rId3"/>
+              </a:rPr>
+              <a:t>http</a:t>
+            </a:r>
+            <a:r>
+              <a:rPr lang="en-US" dirty="0" smtClean="0">
+                <a:hlinkClick r:id="rId3"/>
+              </a:rPr>
+              <a:t>://maven.apache.org/</a:t>
             </a:r>
             <a:endParaRPr lang="en-US" dirty="0">
               <a:latin typeface="Trebuchet MS" pitchFamily="34" charset="0"/>
@@ -4887,9 +5478,6 @@
               </a:rPr>
               <a:t>src</a:t>
             </a:r>
-            <a:endParaRPr lang="en-US" sz="2000" dirty="0" smtClean="0">
-              <a:latin typeface="Trebuchet MS" pitchFamily="34" charset="0"/>
-            </a:endParaRPr>
           </a:p>
           <a:p>
             <a:pPr marL="1252538" lvl="2">
@@ -4902,13 +5490,7 @@
               <a:rPr lang="en-US" sz="2000" dirty="0" smtClean="0">
                 <a:latin typeface="Trebuchet MS" pitchFamily="34" charset="0"/>
               </a:rPr>
-              <a:t>m</a:t>
-            </a:r>
-            <a:r>
-              <a:rPr lang="en-US" sz="2000" dirty="0" smtClean="0">
-                <a:latin typeface="Trebuchet MS" pitchFamily="34" charset="0"/>
-              </a:rPr>
-              <a:t>ain</a:t>
+              <a:t>main</a:t>
             </a:r>
           </a:p>
           <a:p>
@@ -4922,13 +5504,7 @@
               <a:rPr lang="en-US" dirty="0" smtClean="0">
                 <a:latin typeface="Trebuchet MS" pitchFamily="34" charset="0"/>
               </a:rPr>
-              <a:t>j</a:t>
-            </a:r>
-            <a:r>
-              <a:rPr lang="en-US" dirty="0" smtClean="0">
-                <a:latin typeface="Trebuchet MS" pitchFamily="34" charset="0"/>
-              </a:rPr>
-              <a:t>ava</a:t>
+              <a:t>java</a:t>
             </a:r>
           </a:p>
           <a:p>
@@ -4942,13 +5518,7 @@
               <a:rPr lang="en-US" dirty="0" smtClean="0">
                 <a:latin typeface="Trebuchet MS" pitchFamily="34" charset="0"/>
               </a:rPr>
-              <a:t>r</a:t>
-            </a:r>
-            <a:r>
-              <a:rPr lang="en-US" dirty="0" smtClean="0">
-                <a:latin typeface="Trebuchet MS" pitchFamily="34" charset="0"/>
-              </a:rPr>
-              <a:t>esources</a:t>
+              <a:t>resources</a:t>
             </a:r>
           </a:p>
           <a:p>
@@ -4964,9 +5534,6 @@
               </a:rPr>
               <a:t>webapp</a:t>
             </a:r>
-            <a:endParaRPr lang="en-US" dirty="0" smtClean="0">
-              <a:latin typeface="Trebuchet MS" pitchFamily="34" charset="0"/>
-            </a:endParaRPr>
           </a:p>
           <a:p>
             <a:pPr marL="1252538" lvl="2">
@@ -4979,13 +5546,7 @@
               <a:rPr lang="en-US" sz="2000" dirty="0" smtClean="0">
                 <a:latin typeface="Trebuchet MS" pitchFamily="34" charset="0"/>
               </a:rPr>
-              <a:t>t</a:t>
-            </a:r>
-            <a:r>
-              <a:rPr lang="en-US" sz="2000" dirty="0" smtClean="0">
-                <a:latin typeface="Trebuchet MS" pitchFamily="34" charset="0"/>
-              </a:rPr>
-              <a:t>est</a:t>
+              <a:t>test</a:t>
             </a:r>
           </a:p>
           <a:p>
@@ -5027,13 +5588,7 @@
               <a:rPr lang="en-US" sz="2000" dirty="0" smtClean="0">
                 <a:latin typeface="Trebuchet MS" pitchFamily="34" charset="0"/>
               </a:rPr>
-              <a:t>t</a:t>
-            </a:r>
-            <a:r>
-              <a:rPr lang="en-US" sz="2000" dirty="0" smtClean="0">
-                <a:latin typeface="Trebuchet MS" pitchFamily="34" charset="0"/>
-              </a:rPr>
-              <a:t>arget</a:t>
+              <a:t>target</a:t>
             </a:r>
           </a:p>
           <a:p>

</xml_diff>